<commit_message>
edit logo image and add STUDY_NOTE.md
</commit_message>
<xml_diff>
--- a/Project/LogoImage/logo.pptx
+++ b/Project/LogoImage/logo.pptx
@@ -6,6 +6,7 @@
   </p:sldMasterIdLst>
   <p:sldIdLst>
     <p:sldId id="256" r:id="rId2"/>
+    <p:sldId id="257" r:id="rId3"/>
   </p:sldIdLst>
   <p:sldSz cx="12192000" cy="6858000"/>
   <p:notesSz cx="7104063" cy="10234613"/>
@@ -104,6 +105,11 @@
       </a:defRPr>
     </a:lvl9pPr>
   </p:defaultTextStyle>
+  <p:extLst>
+    <p:ext uri="{EFAFB233-063F-42B5-8137-9DF3F51BA10A}">
+      <p15:sldGuideLst xmlns:p15="http://schemas.microsoft.com/office/powerpoint/2012/main"/>
+    </p:ext>
+  </p:extLst>
 </p:presentation>
 </file>
 
@@ -3339,7 +3345,7 @@
         </p:nvSpPr>
         <p:spPr>
           <a:xfrm>
-            <a:off x="2871945" y="47980"/>
+            <a:off x="2871945" y="-304719"/>
             <a:ext cx="3390672" cy="7786747"/>
           </a:xfrm>
           <a:prstGeom prst="rect">
@@ -3468,6 +3474,240 @@
     <p:extLst>
       <p:ext uri="{BB962C8B-B14F-4D97-AF65-F5344CB8AC3E}">
         <p14:creationId xmlns:p14="http://schemas.microsoft.com/office/powerpoint/2010/main" val="941431991"/>
+      </p:ext>
+    </p:extLst>
+  </p:cSld>
+  <p:clrMapOvr>
+    <a:masterClrMapping/>
+  </p:clrMapOvr>
+</p:sld>
+</file>
+
+<file path=ppt/slides/slide2.xml><?xml version="1.0" encoding="utf-8"?>
+<p:sld xmlns:a="http://schemas.openxmlformats.org/drawingml/2006/main" xmlns:r="http://schemas.openxmlformats.org/officeDocument/2006/relationships" xmlns:p="http://schemas.openxmlformats.org/presentationml/2006/main">
+  <p:cSld>
+    <p:spTree>
+      <p:nvGrpSpPr>
+        <p:cNvPr id="1" name=""/>
+        <p:cNvGrpSpPr/>
+        <p:nvPr/>
+      </p:nvGrpSpPr>
+      <p:grpSpPr>
+        <a:xfrm>
+          <a:off x="0" y="0"/>
+          <a:ext cx="0" cy="0"/>
+          <a:chOff x="0" y="0"/>
+          <a:chExt cx="0" cy="0"/>
+        </a:xfrm>
+      </p:grpSpPr>
+      <p:sp>
+        <p:nvSpPr>
+          <p:cNvPr id="4" name="직사각형 3">
+            <a:extLst>
+              <a:ext uri="{FF2B5EF4-FFF2-40B4-BE49-F238E27FC236}">
+                <a16:creationId xmlns:a16="http://schemas.microsoft.com/office/drawing/2014/main" id="{F7498343-2C88-4DB4-BAEA-E4C20A2ABD65}"/>
+              </a:ext>
+            </a:extLst>
+          </p:cNvPr>
+          <p:cNvSpPr/>
+          <p:nvPr/>
+        </p:nvSpPr>
+        <p:spPr>
+          <a:xfrm>
+            <a:off x="2871945" y="-304719"/>
+            <a:ext cx="3390672" cy="7786747"/>
+          </a:xfrm>
+          <a:prstGeom prst="rect">
+            <a:avLst/>
+          </a:prstGeom>
+          <a:noFill/>
+        </p:spPr>
+        <p:txBody>
+          <a:bodyPr wrap="none" lIns="91440" tIns="45720" rIns="91440" bIns="45720">
+            <a:spAutoFit/>
+          </a:bodyPr>
+          <a:lstStyle/>
+          <a:p>
+            <a:pPr algn="ctr"/>
+            <a:r>
+              <a:rPr lang="en-US" altLang="ko-KR" sz="50000" dirty="0">
+                <a:ln w="0"/>
+                <a:solidFill>
+                  <a:srgbClr val="4B4B4B"/>
+                </a:solidFill>
+                <a:effectLst>
+                  <a:outerShdw blurRad="38100" dist="19050" dir="2700000" algn="tl" rotWithShape="0">
+                    <a:schemeClr val="dk1">
+                      <a:alpha val="40000"/>
+                    </a:schemeClr>
+                  </a:outerShdw>
+                </a:effectLst>
+                <a:latin typeface="나눔손글씨 붓" panose="03060600000000000000" pitchFamily="66" charset="-127"/>
+                <a:ea typeface="나눔손글씨 붓" panose="03060600000000000000" pitchFamily="66" charset="-127"/>
+              </a:rPr>
+              <a:t>A</a:t>
+            </a:r>
+          </a:p>
+        </p:txBody>
+      </p:sp>
+      <p:sp>
+        <p:nvSpPr>
+          <p:cNvPr id="5" name="직사각형 4">
+            <a:extLst>
+              <a:ext uri="{FF2B5EF4-FFF2-40B4-BE49-F238E27FC236}">
+                <a16:creationId xmlns:a16="http://schemas.microsoft.com/office/drawing/2014/main" id="{8F6CE020-0AD0-426F-8B16-6E666E2A04B4}"/>
+              </a:ext>
+            </a:extLst>
+          </p:cNvPr>
+          <p:cNvSpPr/>
+          <p:nvPr/>
+        </p:nvSpPr>
+        <p:spPr>
+          <a:xfrm rot="624358">
+            <a:off x="5897133" y="-283224"/>
+            <a:ext cx="3352201" cy="10095071"/>
+          </a:xfrm>
+          <a:prstGeom prst="rect">
+            <a:avLst/>
+          </a:prstGeom>
+          <a:noFill/>
+        </p:spPr>
+        <p:txBody>
+          <a:bodyPr wrap="none" lIns="91440" tIns="45720" rIns="91440" bIns="45720">
+            <a:spAutoFit/>
+          </a:bodyPr>
+          <a:lstStyle/>
+          <a:p>
+            <a:pPr algn="ctr"/>
+            <a:r>
+              <a:rPr lang="en-US" altLang="ko-KR" sz="64000" dirty="0">
+                <a:ln w="0"/>
+                <a:solidFill>
+                  <a:srgbClr val="4B4B4B"/>
+                </a:solidFill>
+                <a:effectLst>
+                  <a:outerShdw blurRad="38100" dist="19050" dir="2700000" algn="tl" rotWithShape="0">
+                    <a:schemeClr val="dk1">
+                      <a:alpha val="40000"/>
+                    </a:schemeClr>
+                  </a:outerShdw>
+                </a:effectLst>
+                <a:latin typeface="나눔손글씨 붓" panose="03060600000000000000" pitchFamily="66" charset="-127"/>
+                <a:ea typeface="나눔손글씨 붓" panose="03060600000000000000" pitchFamily="66" charset="-127"/>
+              </a:rPr>
+              <a:t>D</a:t>
+            </a:r>
+          </a:p>
+        </p:txBody>
+      </p:sp>
+      <p:pic>
+        <p:nvPicPr>
+          <p:cNvPr id="7" name="그래픽 6">
+            <a:extLst>
+              <a:ext uri="{FF2B5EF4-FFF2-40B4-BE49-F238E27FC236}">
+                <a16:creationId xmlns:a16="http://schemas.microsoft.com/office/drawing/2014/main" id="{D16E6FC4-E16D-4EC0-B40E-80AD01DD1CF1}"/>
+              </a:ext>
+            </a:extLst>
+          </p:cNvPr>
+          <p:cNvPicPr>
+            <a:picLocks noChangeAspect="1"/>
+          </p:cNvPicPr>
+          <p:nvPr/>
+        </p:nvPicPr>
+        <p:blipFill>
+          <a:blip r:embed="rId2">
+            <a:extLst>
+              <a:ext uri="{28A0092B-C50C-407E-A947-70E740481C1C}">
+                <a14:useLocalDpi xmlns:a14="http://schemas.microsoft.com/office/drawing/2010/main" val="0"/>
+              </a:ext>
+              <a:ext uri="{96DAC541-7B7A-43D3-8B79-37D633B846F1}">
+                <asvg:svgBlip xmlns:asvg="http://schemas.microsoft.com/office/drawing/2016/SVG/main" r:embed="rId3"/>
+              </a:ext>
+            </a:extLst>
+          </a:blip>
+          <a:stretch>
+            <a:fillRect/>
+          </a:stretch>
+        </p:blipFill>
+        <p:spPr>
+          <a:xfrm rot="464253">
+            <a:off x="6744927" y="370710"/>
+            <a:ext cx="3201390" cy="2473801"/>
+          </a:xfrm>
+          <a:prstGeom prst="rect">
+            <a:avLst/>
+          </a:prstGeom>
+        </p:spPr>
+      </p:pic>
+      <p:sp>
+        <p:nvSpPr>
+          <p:cNvPr id="2" name="TextBox 1">
+            <a:extLst>
+              <a:ext uri="{FF2B5EF4-FFF2-40B4-BE49-F238E27FC236}">
+                <a16:creationId xmlns:a16="http://schemas.microsoft.com/office/drawing/2014/main" id="{AC5E85CA-97E1-4A19-A59E-7E4868D22B63}"/>
+              </a:ext>
+            </a:extLst>
+          </p:cNvPr>
+          <p:cNvSpPr txBox="1"/>
+          <p:nvPr/>
+        </p:nvSpPr>
+        <p:spPr>
+          <a:xfrm>
+            <a:off x="2285130" y="5564776"/>
+            <a:ext cx="4107215" cy="769441"/>
+          </a:xfrm>
+          <a:prstGeom prst="rect">
+            <a:avLst/>
+          </a:prstGeom>
+          <a:noFill/>
+        </p:spPr>
+        <p:txBody>
+          <a:bodyPr wrap="none" rtlCol="0">
+            <a:spAutoFit/>
+          </a:bodyPr>
+          <a:lstStyle/>
+          <a:p>
+            <a:pPr algn="ctr"/>
+            <a:r>
+              <a:rPr lang="en-US" altLang="ko-KR" sz="4400" dirty="0" err="1">
+                <a:solidFill>
+                  <a:srgbClr val="4B4B4B"/>
+                </a:solidFill>
+                <a:latin typeface="BrushScript BT" pitchFamily="2" charset="0"/>
+              </a:rPr>
+              <a:t>AshDragon</a:t>
+            </a:r>
+            <a:r>
+              <a:rPr lang="en-US" altLang="ko-KR" sz="4400" dirty="0">
+                <a:solidFill>
+                  <a:srgbClr val="4B4B4B"/>
+                </a:solidFill>
+                <a:latin typeface="BrushScript BT" pitchFamily="2" charset="0"/>
+              </a:rPr>
+              <a:t> </a:t>
+            </a:r>
+            <a:r>
+              <a:rPr lang="en-US" altLang="ko-KR" sz="4400" dirty="0" err="1">
+                <a:solidFill>
+                  <a:srgbClr val="4B4B4B"/>
+                </a:solidFill>
+                <a:latin typeface="BrushScript BT" pitchFamily="2" charset="0"/>
+              </a:rPr>
+              <a:t>Stduio</a:t>
+            </a:r>
+            <a:endParaRPr lang="ko-KR" altLang="en-US" sz="4400" dirty="0">
+              <a:solidFill>
+                <a:srgbClr val="4B4B4B"/>
+              </a:solidFill>
+              <a:latin typeface="BrushScript BT" pitchFamily="2" charset="0"/>
+            </a:endParaRPr>
+          </a:p>
+        </p:txBody>
+      </p:sp>
+    </p:spTree>
+    <p:extLst>
+      <p:ext uri="{BB962C8B-B14F-4D97-AF65-F5344CB8AC3E}">
+        <p14:creationId xmlns:p14="http://schemas.microsoft.com/office/powerpoint/2010/main" val="2184167318"/>
       </p:ext>
     </p:extLst>
   </p:cSld>

</xml_diff>